<commit_message>
completed information for the saturday lecture
</commit_message>
<xml_diff>
--- a/crash-course/20230624-shell-js-python-php/fundamentals-of-coding.pptx
+++ b/crash-course/20230624-shell-js-python-php/fundamentals-of-coding.pptx
@@ -5,7 +5,7 @@
     <p:sldMasterId id="2147483648" r:id="rId1"/>
   </p:sldMasterIdLst>
   <p:notesMasterIdLst>
-    <p:notesMasterId r:id="rId14"/>
+    <p:notesMasterId r:id="rId17"/>
   </p:notesMasterIdLst>
   <p:sldIdLst>
     <p:sldId id="256" r:id="rId2"/>
@@ -20,6 +20,9 @@
     <p:sldId id="295" r:id="rId11"/>
     <p:sldId id="301" r:id="rId12"/>
     <p:sldId id="302" r:id="rId13"/>
+    <p:sldId id="303" r:id="rId14"/>
+    <p:sldId id="304" r:id="rId15"/>
+    <p:sldId id="305" r:id="rId16"/>
   </p:sldIdLst>
   <p:sldSz cx="12192000" cy="6858000"/>
   <p:notesSz cx="6858000" cy="9144000"/>
@@ -6574,6 +6577,1527 @@
     <p:extLst>
       <p:ext uri="{BB962C8B-B14F-4D97-AF65-F5344CB8AC3E}">
         <p14:creationId xmlns:p14="http://schemas.microsoft.com/office/powerpoint/2010/main" val="2169717674"/>
+      </p:ext>
+    </p:extLst>
+  </p:cSld>
+  <p:clrMapOvr>
+    <a:masterClrMapping/>
+  </p:clrMapOvr>
+</p:sld>
+</file>
+
+<file path=ppt/slides/slide13.xml><?xml version="1.0" encoding="utf-8"?>
+<p:sld xmlns:a="http://schemas.openxmlformats.org/drawingml/2006/main" xmlns:r="http://schemas.openxmlformats.org/officeDocument/2006/relationships" xmlns:p="http://schemas.openxmlformats.org/presentationml/2006/main">
+  <p:cSld>
+    <p:spTree>
+      <p:nvGrpSpPr>
+        <p:cNvPr id="1" name=""/>
+        <p:cNvGrpSpPr/>
+        <p:nvPr/>
+      </p:nvGrpSpPr>
+      <p:grpSpPr>
+        <a:xfrm>
+          <a:off x="0" y="0"/>
+          <a:ext cx="0" cy="0"/>
+          <a:chOff x="0" y="0"/>
+          <a:chExt cx="0" cy="0"/>
+        </a:xfrm>
+      </p:grpSpPr>
+      <p:sp>
+        <p:nvSpPr>
+          <p:cNvPr id="2" name="Rectangle 1">
+            <a:extLst>
+              <a:ext uri="{FF2B5EF4-FFF2-40B4-BE49-F238E27FC236}">
+                <a16:creationId xmlns:a16="http://schemas.microsoft.com/office/drawing/2014/main" id="{9A46497E-08E3-42E3-B95C-DE59A20F68FB}"/>
+              </a:ext>
+            </a:extLst>
+          </p:cNvPr>
+          <p:cNvSpPr/>
+          <p:nvPr/>
+        </p:nvSpPr>
+        <p:spPr>
+          <a:xfrm>
+            <a:off x="5633456" y="1730825"/>
+            <a:ext cx="798945" cy="45719"/>
+          </a:xfrm>
+          <a:prstGeom prst="rect">
+            <a:avLst/>
+          </a:prstGeom>
+          <a:solidFill>
+            <a:srgbClr val="FF0000"/>
+          </a:solidFill>
+          <a:ln>
+            <a:solidFill>
+              <a:srgbClr val="FF0000"/>
+            </a:solidFill>
+          </a:ln>
+        </p:spPr>
+        <p:style>
+          <a:lnRef idx="2">
+            <a:schemeClr val="accent1">
+              <a:shade val="50000"/>
+            </a:schemeClr>
+          </a:lnRef>
+          <a:fillRef idx="1">
+            <a:schemeClr val="accent1"/>
+          </a:fillRef>
+          <a:effectRef idx="0">
+            <a:schemeClr val="accent1"/>
+          </a:effectRef>
+          <a:fontRef idx="minor">
+            <a:schemeClr val="lt1"/>
+          </a:fontRef>
+        </p:style>
+        <p:txBody>
+          <a:bodyPr rtlCol="0" anchor="ctr"/>
+          <a:lstStyle/>
+          <a:p>
+            <a:pPr algn="ctr"/>
+            <a:endParaRPr lang="en-CA"/>
+          </a:p>
+        </p:txBody>
+      </p:sp>
+      <p:sp>
+        <p:nvSpPr>
+          <p:cNvPr id="3" name="TextBox 2">
+            <a:extLst>
+              <a:ext uri="{FF2B5EF4-FFF2-40B4-BE49-F238E27FC236}">
+                <a16:creationId xmlns:a16="http://schemas.microsoft.com/office/drawing/2014/main" id="{D6AA3631-133A-4901-BC13-5DF81E89F1CF}"/>
+              </a:ext>
+            </a:extLst>
+          </p:cNvPr>
+          <p:cNvSpPr txBox="1"/>
+          <p:nvPr/>
+        </p:nvSpPr>
+        <p:spPr>
+          <a:xfrm>
+            <a:off x="1750167" y="913721"/>
+            <a:ext cx="8543464" cy="630942"/>
+          </a:xfrm>
+          <a:prstGeom prst="rect">
+            <a:avLst/>
+          </a:prstGeom>
+          <a:noFill/>
+        </p:spPr>
+        <p:txBody>
+          <a:bodyPr wrap="square" rtlCol="0">
+            <a:spAutoFit/>
+          </a:bodyPr>
+          <a:lstStyle/>
+          <a:p>
+            <a:pPr algn="ctr"/>
+            <a:r>
+              <a:rPr lang="en-CA" sz="3500" dirty="0">
+                <a:latin typeface="Proxima Nova Bl" panose="02000506030000020004" pitchFamily="50" charset="0"/>
+              </a:rPr>
+              <a:t>OBJECTS</a:t>
+            </a:r>
+          </a:p>
+        </p:txBody>
+      </p:sp>
+      <p:sp>
+        <p:nvSpPr>
+          <p:cNvPr id="5" name="TextBox 4">
+            <a:extLst>
+              <a:ext uri="{FF2B5EF4-FFF2-40B4-BE49-F238E27FC236}">
+                <a16:creationId xmlns:a16="http://schemas.microsoft.com/office/drawing/2014/main" id="{A419203C-31B3-551D-352D-03AAC1844AA1}"/>
+              </a:ext>
+            </a:extLst>
+          </p:cNvPr>
+          <p:cNvSpPr txBox="1"/>
+          <p:nvPr/>
+        </p:nvSpPr>
+        <p:spPr>
+          <a:xfrm>
+            <a:off x="857396" y="2244018"/>
+            <a:ext cx="9966127" cy="1200329"/>
+          </a:xfrm>
+          <a:prstGeom prst="rect">
+            <a:avLst/>
+          </a:prstGeom>
+          <a:noFill/>
+        </p:spPr>
+        <p:txBody>
+          <a:bodyPr wrap="square" rtlCol="0">
+            <a:spAutoFit/>
+          </a:bodyPr>
+          <a:lstStyle/>
+          <a:p>
+            <a:r>
+              <a:rPr lang="en-CA" dirty="0">
+                <a:latin typeface="Open Sans" panose="020B0606030504020204" pitchFamily="34" charset="0"/>
+                <a:ea typeface="Open Sans" panose="020B0606030504020204" pitchFamily="34" charset="0"/>
+                <a:cs typeface="Open Sans" panose="020B0606030504020204" pitchFamily="34" charset="0"/>
+              </a:rPr>
+              <a:t>We can use variables to store </a:t>
+            </a:r>
+            <a:r>
+              <a:rPr lang="en-CA" b="1" dirty="0">
+                <a:solidFill>
+                  <a:srgbClr val="00B050"/>
+                </a:solidFill>
+                <a:latin typeface="Open Sans" panose="020B0606030504020204" pitchFamily="34" charset="0"/>
+                <a:ea typeface="Open Sans" panose="020B0606030504020204" pitchFamily="34" charset="0"/>
+                <a:cs typeface="Open Sans" panose="020B0606030504020204" pitchFamily="34" charset="0"/>
+              </a:rPr>
+              <a:t>objects</a:t>
+            </a:r>
+            <a:r>
+              <a:rPr lang="en-CA" dirty="0">
+                <a:latin typeface="Open Sans" panose="020B0606030504020204" pitchFamily="34" charset="0"/>
+                <a:ea typeface="Open Sans" panose="020B0606030504020204" pitchFamily="34" charset="0"/>
+                <a:cs typeface="Open Sans" panose="020B0606030504020204" pitchFamily="34" charset="0"/>
+              </a:rPr>
+              <a:t>.  An object can be used to group values of different </a:t>
+            </a:r>
+            <a:r>
+              <a:rPr lang="en-CA" b="1" dirty="0">
+                <a:solidFill>
+                  <a:srgbClr val="00B050"/>
+                </a:solidFill>
+                <a:latin typeface="Open Sans" panose="020B0606030504020204" pitchFamily="34" charset="0"/>
+                <a:ea typeface="Open Sans" panose="020B0606030504020204" pitchFamily="34" charset="0"/>
+                <a:cs typeface="Open Sans" panose="020B0606030504020204" pitchFamily="34" charset="0"/>
+              </a:rPr>
+              <a:t>properties</a:t>
+            </a:r>
+            <a:r>
+              <a:rPr lang="en-CA" dirty="0">
+                <a:latin typeface="Open Sans" panose="020B0606030504020204" pitchFamily="34" charset="0"/>
+                <a:ea typeface="Open Sans" panose="020B0606030504020204" pitchFamily="34" charset="0"/>
+                <a:cs typeface="Open Sans" panose="020B0606030504020204" pitchFamily="34" charset="0"/>
+              </a:rPr>
+              <a:t> and </a:t>
+            </a:r>
+            <a:r>
+              <a:rPr lang="en-CA" b="1" dirty="0">
+                <a:solidFill>
+                  <a:srgbClr val="00B050"/>
+                </a:solidFill>
+                <a:latin typeface="Open Sans" panose="020B0606030504020204" pitchFamily="34" charset="0"/>
+                <a:ea typeface="Open Sans" panose="020B0606030504020204" pitchFamily="34" charset="0"/>
+                <a:cs typeface="Open Sans" panose="020B0606030504020204" pitchFamily="34" charset="0"/>
+              </a:rPr>
+              <a:t>methods</a:t>
+            </a:r>
+            <a:r>
+              <a:rPr lang="en-CA" dirty="0">
+                <a:latin typeface="Open Sans" panose="020B0606030504020204" pitchFamily="34" charset="0"/>
+                <a:ea typeface="Open Sans" panose="020B0606030504020204" pitchFamily="34" charset="0"/>
+                <a:cs typeface="Open Sans" panose="020B0606030504020204" pitchFamily="34" charset="0"/>
+              </a:rPr>
+              <a:t> into one item.  If you use a spreadsheet software, then you already have an understanding of objects.  Below is a spreadsheet that shows a list of </a:t>
+            </a:r>
+            <a:r>
+              <a:rPr lang="en-CA" b="1" dirty="0">
+                <a:solidFill>
+                  <a:srgbClr val="00B050"/>
+                </a:solidFill>
+                <a:latin typeface="Open Sans" panose="020B0606030504020204" pitchFamily="34" charset="0"/>
+                <a:ea typeface="Open Sans" panose="020B0606030504020204" pitchFamily="34" charset="0"/>
+                <a:cs typeface="Open Sans" panose="020B0606030504020204" pitchFamily="34" charset="0"/>
+              </a:rPr>
+              <a:t>human</a:t>
+            </a:r>
+            <a:r>
+              <a:rPr lang="en-CA" dirty="0">
+                <a:solidFill>
+                  <a:srgbClr val="00B050"/>
+                </a:solidFill>
+                <a:latin typeface="Open Sans" panose="020B0606030504020204" pitchFamily="34" charset="0"/>
+                <a:ea typeface="Open Sans" panose="020B0606030504020204" pitchFamily="34" charset="0"/>
+                <a:cs typeface="Open Sans" panose="020B0606030504020204" pitchFamily="34" charset="0"/>
+              </a:rPr>
+              <a:t>s</a:t>
+            </a:r>
+            <a:r>
+              <a:rPr lang="en-CA" dirty="0">
+                <a:latin typeface="Open Sans" panose="020B0606030504020204" pitchFamily="34" charset="0"/>
+                <a:ea typeface="Open Sans" panose="020B0606030504020204" pitchFamily="34" charset="0"/>
+                <a:cs typeface="Open Sans" panose="020B0606030504020204" pitchFamily="34" charset="0"/>
+              </a:rPr>
+              <a:t>.  Each human is an object with the properties </a:t>
+            </a:r>
+            <a:r>
+              <a:rPr lang="en-CA" b="1" dirty="0">
+                <a:solidFill>
+                  <a:srgbClr val="00B050"/>
+                </a:solidFill>
+                <a:latin typeface="Open Sans" panose="020B0606030504020204" pitchFamily="34" charset="0"/>
+                <a:ea typeface="Open Sans" panose="020B0606030504020204" pitchFamily="34" charset="0"/>
+                <a:cs typeface="Open Sans" panose="020B0606030504020204" pitchFamily="34" charset="0"/>
+              </a:rPr>
+              <a:t>name</a:t>
+            </a:r>
+            <a:r>
+              <a:rPr lang="en-CA" b="1" dirty="0">
+                <a:solidFill>
+                  <a:schemeClr val="accent6">
+                    <a:lumMod val="75000"/>
+                  </a:schemeClr>
+                </a:solidFill>
+                <a:latin typeface="Open Sans" panose="020B0606030504020204" pitchFamily="34" charset="0"/>
+                <a:ea typeface="Open Sans" panose="020B0606030504020204" pitchFamily="34" charset="0"/>
+                <a:cs typeface="Open Sans" panose="020B0606030504020204" pitchFamily="34" charset="0"/>
+              </a:rPr>
+              <a:t>, </a:t>
+            </a:r>
+            <a:r>
+              <a:rPr lang="en-CA" b="1" dirty="0">
+                <a:solidFill>
+                  <a:srgbClr val="00B050"/>
+                </a:solidFill>
+                <a:latin typeface="Open Sans" panose="020B0606030504020204" pitchFamily="34" charset="0"/>
+                <a:ea typeface="Open Sans" panose="020B0606030504020204" pitchFamily="34" charset="0"/>
+                <a:cs typeface="Open Sans" panose="020B0606030504020204" pitchFamily="34" charset="0"/>
+              </a:rPr>
+              <a:t>language</a:t>
+            </a:r>
+            <a:r>
+              <a:rPr lang="en-CA" b="1" dirty="0">
+                <a:solidFill>
+                  <a:schemeClr val="accent6">
+                    <a:lumMod val="75000"/>
+                  </a:schemeClr>
+                </a:solidFill>
+                <a:latin typeface="Open Sans" panose="020B0606030504020204" pitchFamily="34" charset="0"/>
+                <a:ea typeface="Open Sans" panose="020B0606030504020204" pitchFamily="34" charset="0"/>
+                <a:cs typeface="Open Sans" panose="020B0606030504020204" pitchFamily="34" charset="0"/>
+              </a:rPr>
+              <a:t> </a:t>
+            </a:r>
+            <a:r>
+              <a:rPr lang="en-CA" dirty="0">
+                <a:latin typeface="Open Sans" panose="020B0606030504020204" pitchFamily="34" charset="0"/>
+                <a:ea typeface="Open Sans" panose="020B0606030504020204" pitchFamily="34" charset="0"/>
+                <a:cs typeface="Open Sans" panose="020B0606030504020204" pitchFamily="34" charset="0"/>
+              </a:rPr>
+              <a:t>and</a:t>
+            </a:r>
+            <a:r>
+              <a:rPr lang="en-CA" dirty="0">
+                <a:solidFill>
+                  <a:schemeClr val="accent6">
+                    <a:lumMod val="75000"/>
+                  </a:schemeClr>
+                </a:solidFill>
+                <a:latin typeface="Open Sans" panose="020B0606030504020204" pitchFamily="34" charset="0"/>
+                <a:ea typeface="Open Sans" panose="020B0606030504020204" pitchFamily="34" charset="0"/>
+                <a:cs typeface="Open Sans" panose="020B0606030504020204" pitchFamily="34" charset="0"/>
+              </a:rPr>
+              <a:t> </a:t>
+            </a:r>
+            <a:r>
+              <a:rPr lang="en-CA" b="1" dirty="0">
+                <a:solidFill>
+                  <a:srgbClr val="00B050"/>
+                </a:solidFill>
+                <a:latin typeface="Open Sans" panose="020B0606030504020204" pitchFamily="34" charset="0"/>
+                <a:ea typeface="Open Sans" panose="020B0606030504020204" pitchFamily="34" charset="0"/>
+                <a:cs typeface="Open Sans" panose="020B0606030504020204" pitchFamily="34" charset="0"/>
+              </a:rPr>
+              <a:t>dob</a:t>
+            </a:r>
+            <a:r>
+              <a:rPr lang="en-CA" dirty="0">
+                <a:latin typeface="Open Sans" panose="020B0606030504020204" pitchFamily="34" charset="0"/>
+                <a:ea typeface="Open Sans" panose="020B0606030504020204" pitchFamily="34" charset="0"/>
+                <a:cs typeface="Open Sans" panose="020B0606030504020204" pitchFamily="34" charset="0"/>
+              </a:rPr>
+              <a:t>.</a:t>
+            </a:r>
+          </a:p>
+        </p:txBody>
+      </p:sp>
+      <p:pic>
+        <p:nvPicPr>
+          <p:cNvPr id="7" name="Picture 6">
+            <a:extLst>
+              <a:ext uri="{FF2B5EF4-FFF2-40B4-BE49-F238E27FC236}">
+                <a16:creationId xmlns:a16="http://schemas.microsoft.com/office/drawing/2014/main" id="{49AC6AA0-8907-7931-CAE1-D2564FDB3DB0}"/>
+              </a:ext>
+            </a:extLst>
+          </p:cNvPr>
+          <p:cNvPicPr>
+            <a:picLocks noChangeAspect="1"/>
+          </p:cNvPicPr>
+          <p:nvPr/>
+        </p:nvPicPr>
+        <p:blipFill>
+          <a:blip r:embed="rId2"/>
+          <a:stretch>
+            <a:fillRect/>
+          </a:stretch>
+        </p:blipFill>
+        <p:spPr>
+          <a:xfrm>
+            <a:off x="3344832" y="3877232"/>
+            <a:ext cx="4381655" cy="1742940"/>
+          </a:xfrm>
+          <a:prstGeom prst="rect">
+            <a:avLst/>
+          </a:prstGeom>
+        </p:spPr>
+      </p:pic>
+    </p:spTree>
+    <p:extLst>
+      <p:ext uri="{BB962C8B-B14F-4D97-AF65-F5344CB8AC3E}">
+        <p14:creationId xmlns:p14="http://schemas.microsoft.com/office/powerpoint/2010/main" val="2622104193"/>
+      </p:ext>
+    </p:extLst>
+  </p:cSld>
+  <p:clrMapOvr>
+    <a:masterClrMapping/>
+  </p:clrMapOvr>
+</p:sld>
+</file>
+
+<file path=ppt/slides/slide14.xml><?xml version="1.0" encoding="utf-8"?>
+<p:sld xmlns:a="http://schemas.openxmlformats.org/drawingml/2006/main" xmlns:r="http://schemas.openxmlformats.org/officeDocument/2006/relationships" xmlns:p="http://schemas.openxmlformats.org/presentationml/2006/main">
+  <p:cSld>
+    <p:spTree>
+      <p:nvGrpSpPr>
+        <p:cNvPr id="1" name=""/>
+        <p:cNvGrpSpPr/>
+        <p:nvPr/>
+      </p:nvGrpSpPr>
+      <p:grpSpPr>
+        <a:xfrm>
+          <a:off x="0" y="0"/>
+          <a:ext cx="0" cy="0"/>
+          <a:chOff x="0" y="0"/>
+          <a:chExt cx="0" cy="0"/>
+        </a:xfrm>
+      </p:grpSpPr>
+      <p:sp>
+        <p:nvSpPr>
+          <p:cNvPr id="2" name="Rectangle 1">
+            <a:extLst>
+              <a:ext uri="{FF2B5EF4-FFF2-40B4-BE49-F238E27FC236}">
+                <a16:creationId xmlns:a16="http://schemas.microsoft.com/office/drawing/2014/main" id="{9A46497E-08E3-42E3-B95C-DE59A20F68FB}"/>
+              </a:ext>
+            </a:extLst>
+          </p:cNvPr>
+          <p:cNvSpPr/>
+          <p:nvPr/>
+        </p:nvSpPr>
+        <p:spPr>
+          <a:xfrm>
+            <a:off x="5633456" y="1730825"/>
+            <a:ext cx="798945" cy="45719"/>
+          </a:xfrm>
+          <a:prstGeom prst="rect">
+            <a:avLst/>
+          </a:prstGeom>
+          <a:solidFill>
+            <a:srgbClr val="FF0000"/>
+          </a:solidFill>
+          <a:ln>
+            <a:solidFill>
+              <a:srgbClr val="FF0000"/>
+            </a:solidFill>
+          </a:ln>
+        </p:spPr>
+        <p:style>
+          <a:lnRef idx="2">
+            <a:schemeClr val="accent1">
+              <a:shade val="50000"/>
+            </a:schemeClr>
+          </a:lnRef>
+          <a:fillRef idx="1">
+            <a:schemeClr val="accent1"/>
+          </a:fillRef>
+          <a:effectRef idx="0">
+            <a:schemeClr val="accent1"/>
+          </a:effectRef>
+          <a:fontRef idx="minor">
+            <a:schemeClr val="lt1"/>
+          </a:fontRef>
+        </p:style>
+        <p:txBody>
+          <a:bodyPr rtlCol="0" anchor="ctr"/>
+          <a:lstStyle/>
+          <a:p>
+            <a:pPr algn="ctr"/>
+            <a:endParaRPr lang="en-CA"/>
+          </a:p>
+        </p:txBody>
+      </p:sp>
+      <p:sp>
+        <p:nvSpPr>
+          <p:cNvPr id="3" name="TextBox 2">
+            <a:extLst>
+              <a:ext uri="{FF2B5EF4-FFF2-40B4-BE49-F238E27FC236}">
+                <a16:creationId xmlns:a16="http://schemas.microsoft.com/office/drawing/2014/main" id="{D6AA3631-133A-4901-BC13-5DF81E89F1CF}"/>
+              </a:ext>
+            </a:extLst>
+          </p:cNvPr>
+          <p:cNvSpPr txBox="1"/>
+          <p:nvPr/>
+        </p:nvSpPr>
+        <p:spPr>
+          <a:xfrm>
+            <a:off x="1750167" y="913721"/>
+            <a:ext cx="8543464" cy="630942"/>
+          </a:xfrm>
+          <a:prstGeom prst="rect">
+            <a:avLst/>
+          </a:prstGeom>
+          <a:noFill/>
+        </p:spPr>
+        <p:txBody>
+          <a:bodyPr wrap="square" rtlCol="0">
+            <a:spAutoFit/>
+          </a:bodyPr>
+          <a:lstStyle/>
+          <a:p>
+            <a:pPr algn="ctr"/>
+            <a:r>
+              <a:rPr lang="en-CA" sz="3500" dirty="0">
+                <a:latin typeface="Proxima Nova Bl" panose="02000506030000020004" pitchFamily="50" charset="0"/>
+              </a:rPr>
+              <a:t>OBJECTS</a:t>
+            </a:r>
+          </a:p>
+        </p:txBody>
+      </p:sp>
+      <p:sp>
+        <p:nvSpPr>
+          <p:cNvPr id="4" name="TextBox 3">
+            <a:extLst>
+              <a:ext uri="{FF2B5EF4-FFF2-40B4-BE49-F238E27FC236}">
+                <a16:creationId xmlns:a16="http://schemas.microsoft.com/office/drawing/2014/main" id="{505CCC65-9DAB-A8B1-FC4B-28EA40F5F749}"/>
+              </a:ext>
+            </a:extLst>
+          </p:cNvPr>
+          <p:cNvSpPr txBox="1"/>
+          <p:nvPr/>
+        </p:nvSpPr>
+        <p:spPr>
+          <a:xfrm>
+            <a:off x="645714" y="2176129"/>
+            <a:ext cx="9966127" cy="646331"/>
+          </a:xfrm>
+          <a:prstGeom prst="rect">
+            <a:avLst/>
+          </a:prstGeom>
+          <a:noFill/>
+        </p:spPr>
+        <p:txBody>
+          <a:bodyPr wrap="square" rtlCol="0">
+            <a:spAutoFit/>
+          </a:bodyPr>
+          <a:lstStyle/>
+          <a:p>
+            <a:r>
+              <a:rPr lang="en-CA" dirty="0">
+                <a:latin typeface="Open Sans" panose="020B0606030504020204" pitchFamily="34" charset="0"/>
+                <a:ea typeface="Open Sans" panose="020B0606030504020204" pitchFamily="34" charset="0"/>
+                <a:cs typeface="Open Sans" panose="020B0606030504020204" pitchFamily="34" charset="0"/>
+              </a:rPr>
+              <a:t>In JavaScript, there are many ways to declare an object and its properties.  These all produce the same results:</a:t>
+            </a:r>
+          </a:p>
+        </p:txBody>
+      </p:sp>
+      <p:sp>
+        <p:nvSpPr>
+          <p:cNvPr id="6" name="TextBox 5">
+            <a:extLst>
+              <a:ext uri="{FF2B5EF4-FFF2-40B4-BE49-F238E27FC236}">
+                <a16:creationId xmlns:a16="http://schemas.microsoft.com/office/drawing/2014/main" id="{28D7308F-9E9D-74EF-C71A-715E8C27B861}"/>
+              </a:ext>
+            </a:extLst>
+          </p:cNvPr>
+          <p:cNvSpPr txBox="1"/>
+          <p:nvPr/>
+        </p:nvSpPr>
+        <p:spPr>
+          <a:xfrm>
+            <a:off x="776011" y="2981920"/>
+            <a:ext cx="2482057" cy="1384995"/>
+          </a:xfrm>
+          <a:prstGeom prst="rect">
+            <a:avLst/>
+          </a:prstGeom>
+          <a:solidFill>
+            <a:schemeClr val="bg2"/>
+          </a:solidFill>
+        </p:spPr>
+        <p:txBody>
+          <a:bodyPr wrap="square" rtlCol="0">
+            <a:spAutoFit/>
+          </a:bodyPr>
+          <a:lstStyle/>
+          <a:p>
+            <a:r>
+              <a:rPr lang="en-CA" sz="1200" dirty="0">
+                <a:latin typeface="Open Sans" panose="020B0606030504020204" pitchFamily="34" charset="0"/>
+                <a:ea typeface="Open Sans" panose="020B0606030504020204" pitchFamily="34" charset="0"/>
+                <a:cs typeface="Open Sans" panose="020B0606030504020204" pitchFamily="34" charset="0"/>
+              </a:rPr>
+              <a:t>var human = new Object();</a:t>
+            </a:r>
+          </a:p>
+          <a:p>
+            <a:endParaRPr lang="en-CA" sz="1200" dirty="0">
+              <a:latin typeface="Open Sans" panose="020B0606030504020204" pitchFamily="34" charset="0"/>
+              <a:ea typeface="Open Sans" panose="020B0606030504020204" pitchFamily="34" charset="0"/>
+              <a:cs typeface="Open Sans" panose="020B0606030504020204" pitchFamily="34" charset="0"/>
+            </a:endParaRPr>
+          </a:p>
+          <a:p>
+            <a:r>
+              <a:rPr lang="en-CA" sz="1200" dirty="0">
+                <a:latin typeface="Open Sans" panose="020B0606030504020204" pitchFamily="34" charset="0"/>
+                <a:ea typeface="Open Sans" panose="020B0606030504020204" pitchFamily="34" charset="0"/>
+                <a:cs typeface="Open Sans" panose="020B0606030504020204" pitchFamily="34" charset="0"/>
+              </a:rPr>
+              <a:t>human.name = "John";</a:t>
+            </a:r>
+          </a:p>
+          <a:p>
+            <a:endParaRPr lang="en-CA" sz="1200" dirty="0">
+              <a:latin typeface="Open Sans" panose="020B0606030504020204" pitchFamily="34" charset="0"/>
+              <a:ea typeface="Open Sans" panose="020B0606030504020204" pitchFamily="34" charset="0"/>
+              <a:cs typeface="Open Sans" panose="020B0606030504020204" pitchFamily="34" charset="0"/>
+            </a:endParaRPr>
+          </a:p>
+          <a:p>
+            <a:r>
+              <a:rPr lang="en-CA" sz="1200" dirty="0" err="1">
+                <a:latin typeface="Open Sans" panose="020B0606030504020204" pitchFamily="34" charset="0"/>
+                <a:ea typeface="Open Sans" panose="020B0606030504020204" pitchFamily="34" charset="0"/>
+                <a:cs typeface="Open Sans" panose="020B0606030504020204" pitchFamily="34" charset="0"/>
+              </a:rPr>
+              <a:t>human.language</a:t>
+            </a:r>
+            <a:r>
+              <a:rPr lang="en-CA" sz="1200" dirty="0">
+                <a:latin typeface="Open Sans" panose="020B0606030504020204" pitchFamily="34" charset="0"/>
+                <a:ea typeface="Open Sans" panose="020B0606030504020204" pitchFamily="34" charset="0"/>
+                <a:cs typeface="Open Sans" panose="020B0606030504020204" pitchFamily="34" charset="0"/>
+              </a:rPr>
+              <a:t> = "</a:t>
+            </a:r>
+            <a:r>
+              <a:rPr lang="en-CA" sz="1200" dirty="0" err="1">
+                <a:latin typeface="Open Sans" panose="020B0606030504020204" pitchFamily="34" charset="0"/>
+                <a:ea typeface="Open Sans" panose="020B0606030504020204" pitchFamily="34" charset="0"/>
+                <a:cs typeface="Open Sans" panose="020B0606030504020204" pitchFamily="34" charset="0"/>
+              </a:rPr>
+              <a:t>en</a:t>
+            </a:r>
+            <a:r>
+              <a:rPr lang="en-CA" sz="1200" dirty="0">
+                <a:latin typeface="Open Sans" panose="020B0606030504020204" pitchFamily="34" charset="0"/>
+                <a:ea typeface="Open Sans" panose="020B0606030504020204" pitchFamily="34" charset="0"/>
+                <a:cs typeface="Open Sans" panose="020B0606030504020204" pitchFamily="34" charset="0"/>
+              </a:rPr>
+              <a:t>";</a:t>
+            </a:r>
+          </a:p>
+          <a:p>
+            <a:endParaRPr lang="en-CA" sz="1200" dirty="0">
+              <a:latin typeface="Open Sans" panose="020B0606030504020204" pitchFamily="34" charset="0"/>
+              <a:ea typeface="Open Sans" panose="020B0606030504020204" pitchFamily="34" charset="0"/>
+              <a:cs typeface="Open Sans" panose="020B0606030504020204" pitchFamily="34" charset="0"/>
+            </a:endParaRPr>
+          </a:p>
+          <a:p>
+            <a:r>
+              <a:rPr lang="en-CA" sz="1200" dirty="0" err="1">
+                <a:latin typeface="Open Sans" panose="020B0606030504020204" pitchFamily="34" charset="0"/>
+                <a:ea typeface="Open Sans" panose="020B0606030504020204" pitchFamily="34" charset="0"/>
+                <a:cs typeface="Open Sans" panose="020B0606030504020204" pitchFamily="34" charset="0"/>
+              </a:rPr>
+              <a:t>human.dob</a:t>
+            </a:r>
+            <a:r>
+              <a:rPr lang="en-CA" sz="1200" dirty="0">
+                <a:latin typeface="Open Sans" panose="020B0606030504020204" pitchFamily="34" charset="0"/>
+                <a:ea typeface="Open Sans" panose="020B0606030504020204" pitchFamily="34" charset="0"/>
+                <a:cs typeface="Open Sans" panose="020B0606030504020204" pitchFamily="34" charset="0"/>
+              </a:rPr>
+              <a:t> = "1911-01-24";</a:t>
+            </a:r>
+          </a:p>
+        </p:txBody>
+      </p:sp>
+      <p:sp>
+        <p:nvSpPr>
+          <p:cNvPr id="8" name="TextBox 7">
+            <a:extLst>
+              <a:ext uri="{FF2B5EF4-FFF2-40B4-BE49-F238E27FC236}">
+                <a16:creationId xmlns:a16="http://schemas.microsoft.com/office/drawing/2014/main" id="{F96552F6-8A61-A6E3-138B-57F221D99315}"/>
+              </a:ext>
+            </a:extLst>
+          </p:cNvPr>
+          <p:cNvSpPr txBox="1"/>
+          <p:nvPr/>
+        </p:nvSpPr>
+        <p:spPr>
+          <a:xfrm>
+            <a:off x="3375041" y="2981920"/>
+            <a:ext cx="2482056" cy="1384995"/>
+          </a:xfrm>
+          <a:prstGeom prst="rect">
+            <a:avLst/>
+          </a:prstGeom>
+          <a:solidFill>
+            <a:schemeClr val="bg2"/>
+          </a:solidFill>
+        </p:spPr>
+        <p:txBody>
+          <a:bodyPr wrap="square" rtlCol="0">
+            <a:spAutoFit/>
+          </a:bodyPr>
+          <a:lstStyle/>
+          <a:p>
+            <a:r>
+              <a:rPr lang="en-CA" sz="1200">
+                <a:latin typeface="Open Sans" panose="020B0606030504020204" pitchFamily="34" charset="0"/>
+                <a:ea typeface="Open Sans" panose="020B0606030504020204" pitchFamily="34" charset="0"/>
+                <a:cs typeface="Open Sans" panose="020B0606030504020204" pitchFamily="34" charset="0"/>
+              </a:rPr>
+              <a:t>var human = {};</a:t>
+            </a:r>
+          </a:p>
+          <a:p>
+            <a:endParaRPr lang="en-CA" sz="1200">
+              <a:latin typeface="Open Sans" panose="020B0606030504020204" pitchFamily="34" charset="0"/>
+              <a:ea typeface="Open Sans" panose="020B0606030504020204" pitchFamily="34" charset="0"/>
+              <a:cs typeface="Open Sans" panose="020B0606030504020204" pitchFamily="34" charset="0"/>
+            </a:endParaRPr>
+          </a:p>
+          <a:p>
+            <a:r>
+              <a:rPr lang="en-CA" sz="1200">
+                <a:latin typeface="Open Sans" panose="020B0606030504020204" pitchFamily="34" charset="0"/>
+                <a:ea typeface="Open Sans" panose="020B0606030504020204" pitchFamily="34" charset="0"/>
+                <a:cs typeface="Open Sans" panose="020B0606030504020204" pitchFamily="34" charset="0"/>
+              </a:rPr>
+              <a:t>human.name = "John";</a:t>
+            </a:r>
+          </a:p>
+          <a:p>
+            <a:endParaRPr lang="en-CA" sz="1200">
+              <a:latin typeface="Open Sans" panose="020B0606030504020204" pitchFamily="34" charset="0"/>
+              <a:ea typeface="Open Sans" panose="020B0606030504020204" pitchFamily="34" charset="0"/>
+              <a:cs typeface="Open Sans" panose="020B0606030504020204" pitchFamily="34" charset="0"/>
+            </a:endParaRPr>
+          </a:p>
+          <a:p>
+            <a:r>
+              <a:rPr lang="en-CA" sz="1200" err="1">
+                <a:latin typeface="Open Sans" panose="020B0606030504020204" pitchFamily="34" charset="0"/>
+                <a:ea typeface="Open Sans" panose="020B0606030504020204" pitchFamily="34" charset="0"/>
+                <a:cs typeface="Open Sans" panose="020B0606030504020204" pitchFamily="34" charset="0"/>
+              </a:rPr>
+              <a:t>human</a:t>
+            </a:r>
+            <a:r>
+              <a:rPr lang="en-CA" sz="1200">
+                <a:latin typeface="Open Sans" panose="020B0606030504020204" pitchFamily="34" charset="0"/>
+                <a:ea typeface="Open Sans" panose="020B0606030504020204" pitchFamily="34" charset="0"/>
+                <a:cs typeface="Open Sans" panose="020B0606030504020204" pitchFamily="34" charset="0"/>
+              </a:rPr>
+              <a:t>.language = "en";</a:t>
+            </a:r>
+          </a:p>
+          <a:p>
+            <a:endParaRPr lang="en-CA" sz="1200">
+              <a:latin typeface="Open Sans" panose="020B0606030504020204" pitchFamily="34" charset="0"/>
+              <a:ea typeface="Open Sans" panose="020B0606030504020204" pitchFamily="34" charset="0"/>
+              <a:cs typeface="Open Sans" panose="020B0606030504020204" pitchFamily="34" charset="0"/>
+            </a:endParaRPr>
+          </a:p>
+          <a:p>
+            <a:r>
+              <a:rPr lang="en-CA" sz="1200" err="1">
+                <a:latin typeface="Open Sans" panose="020B0606030504020204" pitchFamily="34" charset="0"/>
+                <a:ea typeface="Open Sans" panose="020B0606030504020204" pitchFamily="34" charset="0"/>
+                <a:cs typeface="Open Sans" panose="020B0606030504020204" pitchFamily="34" charset="0"/>
+              </a:rPr>
+              <a:t>human.dob</a:t>
+            </a:r>
+            <a:r>
+              <a:rPr lang="en-CA" sz="1200">
+                <a:latin typeface="Open Sans" panose="020B0606030504020204" pitchFamily="34" charset="0"/>
+                <a:ea typeface="Open Sans" panose="020B0606030504020204" pitchFamily="34" charset="0"/>
+                <a:cs typeface="Open Sans" panose="020B0606030504020204" pitchFamily="34" charset="0"/>
+              </a:rPr>
+              <a:t> = "1911-01-24";</a:t>
+            </a:r>
+          </a:p>
+        </p:txBody>
+      </p:sp>
+      <p:sp>
+        <p:nvSpPr>
+          <p:cNvPr id="9" name="TextBox 8">
+            <a:extLst>
+              <a:ext uri="{FF2B5EF4-FFF2-40B4-BE49-F238E27FC236}">
+                <a16:creationId xmlns:a16="http://schemas.microsoft.com/office/drawing/2014/main" id="{BD9F733A-2952-E07E-5AE9-18FBD1FFE40B}"/>
+              </a:ext>
+            </a:extLst>
+          </p:cNvPr>
+          <p:cNvSpPr txBox="1"/>
+          <p:nvPr/>
+        </p:nvSpPr>
+        <p:spPr>
+          <a:xfrm>
+            <a:off x="8666200" y="2981920"/>
+            <a:ext cx="2395559" cy="1569660"/>
+          </a:xfrm>
+          <a:prstGeom prst="rect">
+            <a:avLst/>
+          </a:prstGeom>
+          <a:solidFill>
+            <a:schemeClr val="bg2"/>
+          </a:solidFill>
+        </p:spPr>
+        <p:txBody>
+          <a:bodyPr wrap="square" rtlCol="0">
+            <a:spAutoFit/>
+          </a:bodyPr>
+          <a:lstStyle/>
+          <a:p>
+            <a:r>
+              <a:rPr lang="en-CA" sz="1200">
+                <a:latin typeface="Open Sans" panose="020B0606030504020204" pitchFamily="34" charset="0"/>
+                <a:ea typeface="Open Sans" panose="020B0606030504020204" pitchFamily="34" charset="0"/>
+                <a:cs typeface="Open Sans" panose="020B0606030504020204" pitchFamily="34" charset="0"/>
+              </a:rPr>
+              <a:t>var human = {</a:t>
+            </a:r>
+          </a:p>
+          <a:p>
+            <a:endParaRPr lang="en-CA" sz="1200">
+              <a:latin typeface="Open Sans" panose="020B0606030504020204" pitchFamily="34" charset="0"/>
+              <a:ea typeface="Open Sans" panose="020B0606030504020204" pitchFamily="34" charset="0"/>
+              <a:cs typeface="Open Sans" panose="020B0606030504020204" pitchFamily="34" charset="0"/>
+            </a:endParaRPr>
+          </a:p>
+          <a:p>
+            <a:r>
+              <a:rPr lang="en-CA" sz="1200">
+                <a:latin typeface="Open Sans" panose="020B0606030504020204" pitchFamily="34" charset="0"/>
+                <a:ea typeface="Open Sans" panose="020B0606030504020204" pitchFamily="34" charset="0"/>
+                <a:cs typeface="Open Sans" panose="020B0606030504020204" pitchFamily="34" charset="0"/>
+              </a:rPr>
+              <a:t>  "name":"John",</a:t>
+            </a:r>
+          </a:p>
+          <a:p>
+            <a:br>
+              <a:rPr lang="en-CA" sz="1200">
+                <a:latin typeface="Open Sans" panose="020B0606030504020204" pitchFamily="34" charset="0"/>
+                <a:ea typeface="Open Sans" panose="020B0606030504020204" pitchFamily="34" charset="0"/>
+                <a:cs typeface="Open Sans" panose="020B0606030504020204" pitchFamily="34" charset="0"/>
+              </a:rPr>
+            </a:br>
+            <a:r>
+              <a:rPr lang="en-CA" sz="1200">
+                <a:latin typeface="Open Sans" panose="020B0606030504020204" pitchFamily="34" charset="0"/>
+                <a:ea typeface="Open Sans" panose="020B0606030504020204" pitchFamily="34" charset="0"/>
+                <a:cs typeface="Open Sans" panose="020B0606030504020204" pitchFamily="34" charset="0"/>
+              </a:rPr>
+              <a:t>  "language":"en",</a:t>
+            </a:r>
+          </a:p>
+          <a:p>
+            <a:endParaRPr lang="en-CA" sz="1200">
+              <a:latin typeface="Open Sans" panose="020B0606030504020204" pitchFamily="34" charset="0"/>
+              <a:ea typeface="Open Sans" panose="020B0606030504020204" pitchFamily="34" charset="0"/>
+              <a:cs typeface="Open Sans" panose="020B0606030504020204" pitchFamily="34" charset="0"/>
+            </a:endParaRPr>
+          </a:p>
+          <a:p>
+            <a:r>
+              <a:rPr lang="en-CA" sz="1200">
+                <a:latin typeface="Open Sans" panose="020B0606030504020204" pitchFamily="34" charset="0"/>
+                <a:ea typeface="Open Sans" panose="020B0606030504020204" pitchFamily="34" charset="0"/>
+                <a:cs typeface="Open Sans" panose="020B0606030504020204" pitchFamily="34" charset="0"/>
+              </a:rPr>
+              <a:t>   "dob":"1911-01-24"</a:t>
+            </a:r>
+          </a:p>
+          <a:p>
+            <a:r>
+              <a:rPr lang="en-CA" sz="1200">
+                <a:latin typeface="Open Sans" panose="020B0606030504020204" pitchFamily="34" charset="0"/>
+                <a:ea typeface="Open Sans" panose="020B0606030504020204" pitchFamily="34" charset="0"/>
+                <a:cs typeface="Open Sans" panose="020B0606030504020204" pitchFamily="34" charset="0"/>
+              </a:rPr>
+              <a:t>};</a:t>
+            </a:r>
+          </a:p>
+        </p:txBody>
+      </p:sp>
+      <p:sp>
+        <p:nvSpPr>
+          <p:cNvPr id="10" name="TextBox 9">
+            <a:extLst>
+              <a:ext uri="{FF2B5EF4-FFF2-40B4-BE49-F238E27FC236}">
+                <a16:creationId xmlns:a16="http://schemas.microsoft.com/office/drawing/2014/main" id="{31F83237-68E0-6846-99CE-7FEA96668444}"/>
+              </a:ext>
+            </a:extLst>
+          </p:cNvPr>
+          <p:cNvSpPr txBox="1"/>
+          <p:nvPr/>
+        </p:nvSpPr>
+        <p:spPr>
+          <a:xfrm>
+            <a:off x="2666596" y="5148037"/>
+            <a:ext cx="5798977" cy="276999"/>
+          </a:xfrm>
+          <a:prstGeom prst="rect">
+            <a:avLst/>
+          </a:prstGeom>
+          <a:solidFill>
+            <a:schemeClr val="bg2"/>
+          </a:solidFill>
+        </p:spPr>
+        <p:txBody>
+          <a:bodyPr wrap="square" rtlCol="0">
+            <a:spAutoFit/>
+          </a:bodyPr>
+          <a:lstStyle/>
+          <a:p>
+            <a:r>
+              <a:rPr lang="en-CA" sz="1200" dirty="0">
+                <a:latin typeface="Open Sans" panose="020B0606030504020204" pitchFamily="34" charset="0"/>
+                <a:ea typeface="Open Sans" panose="020B0606030504020204" pitchFamily="34" charset="0"/>
+                <a:cs typeface="Open Sans" panose="020B0606030504020204" pitchFamily="34" charset="0"/>
+              </a:rPr>
+              <a:t>console.log(human.name + " " + </a:t>
+            </a:r>
+            <a:r>
+              <a:rPr lang="en-CA" sz="1200" dirty="0" err="1">
+                <a:latin typeface="Open Sans" panose="020B0606030504020204" pitchFamily="34" charset="0"/>
+                <a:ea typeface="Open Sans" panose="020B0606030504020204" pitchFamily="34" charset="0"/>
+                <a:cs typeface="Open Sans" panose="020B0606030504020204" pitchFamily="34" charset="0"/>
+              </a:rPr>
+              <a:t>human.language</a:t>
+            </a:r>
+            <a:r>
+              <a:rPr lang="en-CA" sz="1200" dirty="0">
+                <a:latin typeface="Open Sans" panose="020B0606030504020204" pitchFamily="34" charset="0"/>
+                <a:ea typeface="Open Sans" panose="020B0606030504020204" pitchFamily="34" charset="0"/>
+                <a:cs typeface="Open Sans" panose="020B0606030504020204" pitchFamily="34" charset="0"/>
+              </a:rPr>
+              <a:t> + " " + </a:t>
+            </a:r>
+            <a:r>
+              <a:rPr lang="en-CA" sz="1200" dirty="0" err="1">
+                <a:latin typeface="Open Sans" panose="020B0606030504020204" pitchFamily="34" charset="0"/>
+                <a:ea typeface="Open Sans" panose="020B0606030504020204" pitchFamily="34" charset="0"/>
+                <a:cs typeface="Open Sans" panose="020B0606030504020204" pitchFamily="34" charset="0"/>
+              </a:rPr>
+              <a:t>human.dob</a:t>
+            </a:r>
+            <a:r>
+              <a:rPr lang="en-CA" sz="1200" dirty="0">
+                <a:latin typeface="Open Sans" panose="020B0606030504020204" pitchFamily="34" charset="0"/>
+                <a:ea typeface="Open Sans" panose="020B0606030504020204" pitchFamily="34" charset="0"/>
+                <a:cs typeface="Open Sans" panose="020B0606030504020204" pitchFamily="34" charset="0"/>
+              </a:rPr>
+              <a:t>);</a:t>
+            </a:r>
+          </a:p>
+        </p:txBody>
+      </p:sp>
+      <p:sp>
+        <p:nvSpPr>
+          <p:cNvPr id="11" name="TextBox 10">
+            <a:extLst>
+              <a:ext uri="{FF2B5EF4-FFF2-40B4-BE49-F238E27FC236}">
+                <a16:creationId xmlns:a16="http://schemas.microsoft.com/office/drawing/2014/main" id="{1DEE0198-2649-3447-E6CC-F0B6F133D160}"/>
+              </a:ext>
+            </a:extLst>
+          </p:cNvPr>
+          <p:cNvSpPr txBox="1"/>
+          <p:nvPr/>
+        </p:nvSpPr>
+        <p:spPr>
+          <a:xfrm>
+            <a:off x="645713" y="4567015"/>
+            <a:ext cx="9966127" cy="369332"/>
+          </a:xfrm>
+          <a:prstGeom prst="rect">
+            <a:avLst/>
+          </a:prstGeom>
+          <a:noFill/>
+        </p:spPr>
+        <p:txBody>
+          <a:bodyPr wrap="square" rtlCol="0">
+            <a:spAutoFit/>
+          </a:bodyPr>
+          <a:lstStyle/>
+          <a:p>
+            <a:r>
+              <a:rPr lang="en-CA" dirty="0">
+                <a:latin typeface="Open Sans" panose="020B0606030504020204" pitchFamily="34" charset="0"/>
+                <a:ea typeface="Open Sans" panose="020B0606030504020204" pitchFamily="34" charset="0"/>
+                <a:cs typeface="Open Sans" panose="020B0606030504020204" pitchFamily="34" charset="0"/>
+              </a:rPr>
+              <a:t>You can print the result like this:</a:t>
+            </a:r>
+          </a:p>
+        </p:txBody>
+      </p:sp>
+      <p:sp>
+        <p:nvSpPr>
+          <p:cNvPr id="12" name="TextBox 11">
+            <a:extLst>
+              <a:ext uri="{FF2B5EF4-FFF2-40B4-BE49-F238E27FC236}">
+                <a16:creationId xmlns:a16="http://schemas.microsoft.com/office/drawing/2014/main" id="{A4732775-1F5E-3AA9-084B-4B24E926D8EF}"/>
+              </a:ext>
+            </a:extLst>
+          </p:cNvPr>
+          <p:cNvSpPr txBox="1"/>
+          <p:nvPr/>
+        </p:nvSpPr>
+        <p:spPr>
+          <a:xfrm>
+            <a:off x="5964192" y="2981920"/>
+            <a:ext cx="2594913" cy="1384995"/>
+          </a:xfrm>
+          <a:prstGeom prst="rect">
+            <a:avLst/>
+          </a:prstGeom>
+          <a:solidFill>
+            <a:schemeClr val="bg2"/>
+          </a:solidFill>
+        </p:spPr>
+        <p:txBody>
+          <a:bodyPr wrap="square" rtlCol="0">
+            <a:spAutoFit/>
+          </a:bodyPr>
+          <a:lstStyle/>
+          <a:p>
+            <a:r>
+              <a:rPr lang="en-CA" sz="1200">
+                <a:latin typeface="Open Sans" panose="020B0606030504020204" pitchFamily="34" charset="0"/>
+                <a:ea typeface="Open Sans" panose="020B0606030504020204" pitchFamily="34" charset="0"/>
+                <a:cs typeface="Open Sans" panose="020B0606030504020204" pitchFamily="34" charset="0"/>
+              </a:rPr>
+              <a:t>var human = {};</a:t>
+            </a:r>
+          </a:p>
+          <a:p>
+            <a:endParaRPr lang="en-CA" sz="1200">
+              <a:latin typeface="Open Sans" panose="020B0606030504020204" pitchFamily="34" charset="0"/>
+              <a:ea typeface="Open Sans" panose="020B0606030504020204" pitchFamily="34" charset="0"/>
+              <a:cs typeface="Open Sans" panose="020B0606030504020204" pitchFamily="34" charset="0"/>
+            </a:endParaRPr>
+          </a:p>
+          <a:p>
+            <a:r>
+              <a:rPr lang="en-CA" sz="1200">
+                <a:latin typeface="Open Sans" panose="020B0606030504020204" pitchFamily="34" charset="0"/>
+                <a:ea typeface="Open Sans" panose="020B0606030504020204" pitchFamily="34" charset="0"/>
+                <a:cs typeface="Open Sans" panose="020B0606030504020204" pitchFamily="34" charset="0"/>
+              </a:rPr>
+              <a:t>human["name"] = "John";</a:t>
+            </a:r>
+          </a:p>
+          <a:p>
+            <a:endParaRPr lang="en-CA" sz="1200">
+              <a:latin typeface="Open Sans" panose="020B0606030504020204" pitchFamily="34" charset="0"/>
+              <a:ea typeface="Open Sans" panose="020B0606030504020204" pitchFamily="34" charset="0"/>
+              <a:cs typeface="Open Sans" panose="020B0606030504020204" pitchFamily="34" charset="0"/>
+            </a:endParaRPr>
+          </a:p>
+          <a:p>
+            <a:r>
+              <a:rPr lang="en-CA" sz="1200">
+                <a:latin typeface="Open Sans" panose="020B0606030504020204" pitchFamily="34" charset="0"/>
+                <a:ea typeface="Open Sans" panose="020B0606030504020204" pitchFamily="34" charset="0"/>
+                <a:cs typeface="Open Sans" panose="020B0606030504020204" pitchFamily="34" charset="0"/>
+              </a:rPr>
+              <a:t>human["language"] = "en";</a:t>
+            </a:r>
+          </a:p>
+          <a:p>
+            <a:endParaRPr lang="en-CA" sz="1200">
+              <a:latin typeface="Open Sans" panose="020B0606030504020204" pitchFamily="34" charset="0"/>
+              <a:ea typeface="Open Sans" panose="020B0606030504020204" pitchFamily="34" charset="0"/>
+              <a:cs typeface="Open Sans" panose="020B0606030504020204" pitchFamily="34" charset="0"/>
+            </a:endParaRPr>
+          </a:p>
+          <a:p>
+            <a:r>
+              <a:rPr lang="en-CA" sz="1200">
+                <a:latin typeface="Open Sans" panose="020B0606030504020204" pitchFamily="34" charset="0"/>
+                <a:ea typeface="Open Sans" panose="020B0606030504020204" pitchFamily="34" charset="0"/>
+                <a:cs typeface="Open Sans" panose="020B0606030504020204" pitchFamily="34" charset="0"/>
+              </a:rPr>
+              <a:t>human["dob"] = "1911-01-24";</a:t>
+            </a:r>
+          </a:p>
+        </p:txBody>
+      </p:sp>
+      <p:sp>
+        <p:nvSpPr>
+          <p:cNvPr id="13" name="TextBox 12">
+            <a:extLst>
+              <a:ext uri="{FF2B5EF4-FFF2-40B4-BE49-F238E27FC236}">
+                <a16:creationId xmlns:a16="http://schemas.microsoft.com/office/drawing/2014/main" id="{CCC1430D-EAEF-C137-6FA2-D6CF3A03F23B}"/>
+              </a:ext>
+            </a:extLst>
+          </p:cNvPr>
+          <p:cNvSpPr txBox="1"/>
+          <p:nvPr/>
+        </p:nvSpPr>
+        <p:spPr>
+          <a:xfrm>
+            <a:off x="883488" y="5665650"/>
+            <a:ext cx="6761415" cy="369332"/>
+          </a:xfrm>
+          <a:prstGeom prst="rect">
+            <a:avLst/>
+          </a:prstGeom>
+          <a:noFill/>
+        </p:spPr>
+        <p:txBody>
+          <a:bodyPr wrap="square" rtlCol="0">
+            <a:spAutoFit/>
+          </a:bodyPr>
+          <a:lstStyle/>
+          <a:p>
+            <a:r>
+              <a:rPr lang="en-CA" sz="1800" dirty="0">
+                <a:latin typeface="Open Sans" panose="020B0606030504020204" pitchFamily="34" charset="0"/>
+                <a:ea typeface="Open Sans" panose="020B0606030504020204" pitchFamily="34" charset="0"/>
+                <a:cs typeface="Open Sans" panose="020B0606030504020204" pitchFamily="34" charset="0"/>
+              </a:rPr>
+              <a:t>See </a:t>
+            </a:r>
+            <a:r>
+              <a:rPr lang="en-CA" sz="1800" b="1" dirty="0">
+                <a:solidFill>
+                  <a:srgbClr val="FF0000"/>
+                </a:solidFill>
+                <a:latin typeface="Open Sans" panose="020B0606030504020204" pitchFamily="34" charset="0"/>
+                <a:ea typeface="Open Sans" panose="020B0606030504020204" pitchFamily="34" charset="0"/>
+                <a:cs typeface="Open Sans" panose="020B0606030504020204" pitchFamily="34" charset="0"/>
+              </a:rPr>
+              <a:t>fundamentals/file12.js</a:t>
+            </a:r>
+            <a:endParaRPr lang="en-US" dirty="0"/>
+          </a:p>
+        </p:txBody>
+      </p:sp>
+    </p:spTree>
+    <p:extLst>
+      <p:ext uri="{BB962C8B-B14F-4D97-AF65-F5344CB8AC3E}">
+        <p14:creationId xmlns:p14="http://schemas.microsoft.com/office/powerpoint/2010/main" val="1626884109"/>
+      </p:ext>
+    </p:extLst>
+  </p:cSld>
+  <p:clrMapOvr>
+    <a:masterClrMapping/>
+  </p:clrMapOvr>
+</p:sld>
+</file>
+
+<file path=ppt/slides/slide15.xml><?xml version="1.0" encoding="utf-8"?>
+<p:sld xmlns:a="http://schemas.openxmlformats.org/drawingml/2006/main" xmlns:r="http://schemas.openxmlformats.org/officeDocument/2006/relationships" xmlns:p="http://schemas.openxmlformats.org/presentationml/2006/main">
+  <p:cSld>
+    <p:spTree>
+      <p:nvGrpSpPr>
+        <p:cNvPr id="1" name=""/>
+        <p:cNvGrpSpPr/>
+        <p:nvPr/>
+      </p:nvGrpSpPr>
+      <p:grpSpPr>
+        <a:xfrm>
+          <a:off x="0" y="0"/>
+          <a:ext cx="0" cy="0"/>
+          <a:chOff x="0" y="0"/>
+          <a:chExt cx="0" cy="0"/>
+        </a:xfrm>
+      </p:grpSpPr>
+      <p:sp>
+        <p:nvSpPr>
+          <p:cNvPr id="2" name="Rectangle 1">
+            <a:extLst>
+              <a:ext uri="{FF2B5EF4-FFF2-40B4-BE49-F238E27FC236}">
+                <a16:creationId xmlns:a16="http://schemas.microsoft.com/office/drawing/2014/main" id="{9A46497E-08E3-42E3-B95C-DE59A20F68FB}"/>
+              </a:ext>
+            </a:extLst>
+          </p:cNvPr>
+          <p:cNvSpPr/>
+          <p:nvPr/>
+        </p:nvSpPr>
+        <p:spPr>
+          <a:xfrm>
+            <a:off x="5633456" y="1730825"/>
+            <a:ext cx="798945" cy="45719"/>
+          </a:xfrm>
+          <a:prstGeom prst="rect">
+            <a:avLst/>
+          </a:prstGeom>
+          <a:solidFill>
+            <a:srgbClr val="FF0000"/>
+          </a:solidFill>
+          <a:ln>
+            <a:solidFill>
+              <a:srgbClr val="FF0000"/>
+            </a:solidFill>
+          </a:ln>
+        </p:spPr>
+        <p:style>
+          <a:lnRef idx="2">
+            <a:schemeClr val="accent1">
+              <a:shade val="50000"/>
+            </a:schemeClr>
+          </a:lnRef>
+          <a:fillRef idx="1">
+            <a:schemeClr val="accent1"/>
+          </a:fillRef>
+          <a:effectRef idx="0">
+            <a:schemeClr val="accent1"/>
+          </a:effectRef>
+          <a:fontRef idx="minor">
+            <a:schemeClr val="lt1"/>
+          </a:fontRef>
+        </p:style>
+        <p:txBody>
+          <a:bodyPr rtlCol="0" anchor="ctr"/>
+          <a:lstStyle/>
+          <a:p>
+            <a:pPr algn="ctr"/>
+            <a:endParaRPr lang="en-CA"/>
+          </a:p>
+        </p:txBody>
+      </p:sp>
+      <p:sp>
+        <p:nvSpPr>
+          <p:cNvPr id="3" name="TextBox 2">
+            <a:extLst>
+              <a:ext uri="{FF2B5EF4-FFF2-40B4-BE49-F238E27FC236}">
+                <a16:creationId xmlns:a16="http://schemas.microsoft.com/office/drawing/2014/main" id="{D6AA3631-133A-4901-BC13-5DF81E89F1CF}"/>
+              </a:ext>
+            </a:extLst>
+          </p:cNvPr>
+          <p:cNvSpPr txBox="1"/>
+          <p:nvPr/>
+        </p:nvSpPr>
+        <p:spPr>
+          <a:xfrm>
+            <a:off x="1750167" y="913721"/>
+            <a:ext cx="8543464" cy="630942"/>
+          </a:xfrm>
+          <a:prstGeom prst="rect">
+            <a:avLst/>
+          </a:prstGeom>
+          <a:noFill/>
+        </p:spPr>
+        <p:txBody>
+          <a:bodyPr wrap="square" rtlCol="0">
+            <a:spAutoFit/>
+          </a:bodyPr>
+          <a:lstStyle/>
+          <a:p>
+            <a:pPr algn="ctr"/>
+            <a:r>
+              <a:rPr lang="en-CA" sz="3500" dirty="0">
+                <a:latin typeface="Proxima Nova Bl" panose="02000506030000020004" pitchFamily="50" charset="0"/>
+              </a:rPr>
+              <a:t>OBJECTS</a:t>
+            </a:r>
+          </a:p>
+        </p:txBody>
+      </p:sp>
+      <p:sp>
+        <p:nvSpPr>
+          <p:cNvPr id="5" name="TextBox 4">
+            <a:extLst>
+              <a:ext uri="{FF2B5EF4-FFF2-40B4-BE49-F238E27FC236}">
+                <a16:creationId xmlns:a16="http://schemas.microsoft.com/office/drawing/2014/main" id="{A37B448F-D2B8-1F02-68B9-DBF3404B9085}"/>
+              </a:ext>
+            </a:extLst>
+          </p:cNvPr>
+          <p:cNvSpPr txBox="1"/>
+          <p:nvPr/>
+        </p:nvSpPr>
+        <p:spPr>
+          <a:xfrm>
+            <a:off x="883488" y="5665650"/>
+            <a:ext cx="6761415" cy="369332"/>
+          </a:xfrm>
+          <a:prstGeom prst="rect">
+            <a:avLst/>
+          </a:prstGeom>
+          <a:noFill/>
+        </p:spPr>
+        <p:txBody>
+          <a:bodyPr wrap="square" rtlCol="0">
+            <a:spAutoFit/>
+          </a:bodyPr>
+          <a:lstStyle/>
+          <a:p>
+            <a:r>
+              <a:rPr lang="en-CA" sz="1800" dirty="0">
+                <a:latin typeface="Open Sans" panose="020B0606030504020204" pitchFamily="34" charset="0"/>
+                <a:ea typeface="Open Sans" panose="020B0606030504020204" pitchFamily="34" charset="0"/>
+                <a:cs typeface="Open Sans" panose="020B0606030504020204" pitchFamily="34" charset="0"/>
+              </a:rPr>
+              <a:t>See </a:t>
+            </a:r>
+            <a:r>
+              <a:rPr lang="en-CA" sz="1800" b="1" dirty="0">
+                <a:solidFill>
+                  <a:srgbClr val="FF0000"/>
+                </a:solidFill>
+                <a:latin typeface="Open Sans" panose="020B0606030504020204" pitchFamily="34" charset="0"/>
+                <a:ea typeface="Open Sans" panose="020B0606030504020204" pitchFamily="34" charset="0"/>
+                <a:cs typeface="Open Sans" panose="020B0606030504020204" pitchFamily="34" charset="0"/>
+              </a:rPr>
+              <a:t>fundamentals/file13.js</a:t>
+            </a:r>
+            <a:endParaRPr lang="en-US" dirty="0"/>
+          </a:p>
+        </p:txBody>
+      </p:sp>
+      <p:sp>
+        <p:nvSpPr>
+          <p:cNvPr id="7" name="TextBox 6">
+            <a:extLst>
+              <a:ext uri="{FF2B5EF4-FFF2-40B4-BE49-F238E27FC236}">
+                <a16:creationId xmlns:a16="http://schemas.microsoft.com/office/drawing/2014/main" id="{F7862733-3FC3-BAE9-0B7F-3912610B2082}"/>
+              </a:ext>
+            </a:extLst>
+          </p:cNvPr>
+          <p:cNvSpPr txBox="1"/>
+          <p:nvPr/>
+        </p:nvSpPr>
+        <p:spPr>
+          <a:xfrm>
+            <a:off x="883488" y="2240987"/>
+            <a:ext cx="9966127" cy="369332"/>
+          </a:xfrm>
+          <a:prstGeom prst="rect">
+            <a:avLst/>
+          </a:prstGeom>
+          <a:noFill/>
+        </p:spPr>
+        <p:txBody>
+          <a:bodyPr wrap="square" rtlCol="0">
+            <a:spAutoFit/>
+          </a:bodyPr>
+          <a:lstStyle/>
+          <a:p>
+            <a:r>
+              <a:rPr lang="en-CA">
+                <a:latin typeface="Open Sans" panose="020B0606030504020204" pitchFamily="34" charset="0"/>
+                <a:ea typeface="Open Sans" panose="020B0606030504020204" pitchFamily="34" charset="0"/>
+                <a:cs typeface="Open Sans" panose="020B0606030504020204" pitchFamily="34" charset="0"/>
+              </a:rPr>
+              <a:t>Example: Let’s print the same content as the spreadsheet in a previous slide.</a:t>
+            </a:r>
+          </a:p>
+        </p:txBody>
+      </p:sp>
+      <p:sp>
+        <p:nvSpPr>
+          <p:cNvPr id="14" name="TextBox 13">
+            <a:extLst>
+              <a:ext uri="{FF2B5EF4-FFF2-40B4-BE49-F238E27FC236}">
+                <a16:creationId xmlns:a16="http://schemas.microsoft.com/office/drawing/2014/main" id="{3D51EB5B-CC54-DBF0-96A6-570C9044CB11}"/>
+              </a:ext>
+            </a:extLst>
+          </p:cNvPr>
+          <p:cNvSpPr txBox="1"/>
+          <p:nvPr/>
+        </p:nvSpPr>
+        <p:spPr>
+          <a:xfrm>
+            <a:off x="2326693" y="2872680"/>
+            <a:ext cx="7676008" cy="2462213"/>
+          </a:xfrm>
+          <a:prstGeom prst="rect">
+            <a:avLst/>
+          </a:prstGeom>
+          <a:solidFill>
+            <a:schemeClr val="bg2"/>
+          </a:solidFill>
+        </p:spPr>
+        <p:txBody>
+          <a:bodyPr wrap="square" rtlCol="0">
+            <a:spAutoFit/>
+          </a:bodyPr>
+          <a:lstStyle/>
+          <a:p>
+            <a:r>
+              <a:rPr lang="en-CA" sz="1400" dirty="0">
+                <a:latin typeface="Open Sans" panose="020B0606030504020204" pitchFamily="34" charset="0"/>
+                <a:ea typeface="Open Sans" panose="020B0606030504020204" pitchFamily="34" charset="0"/>
+                <a:cs typeface="Open Sans" panose="020B0606030504020204" pitchFamily="34" charset="0"/>
+              </a:rPr>
+              <a:t>var humans = [</a:t>
+            </a:r>
+          </a:p>
+          <a:p>
+            <a:r>
+              <a:rPr lang="en-CA" sz="1400" dirty="0">
+                <a:latin typeface="Open Sans" panose="020B0606030504020204" pitchFamily="34" charset="0"/>
+                <a:ea typeface="Open Sans" panose="020B0606030504020204" pitchFamily="34" charset="0"/>
+                <a:cs typeface="Open Sans" panose="020B0606030504020204" pitchFamily="34" charset="0"/>
+              </a:rPr>
+              <a:t>  {"name":"John","language":"en","dob":"1911-01-24"},</a:t>
+            </a:r>
+          </a:p>
+          <a:p>
+            <a:endParaRPr lang="en-CA" sz="1400" dirty="0">
+              <a:latin typeface="Open Sans" panose="020B0606030504020204" pitchFamily="34" charset="0"/>
+              <a:ea typeface="Open Sans" panose="020B0606030504020204" pitchFamily="34" charset="0"/>
+              <a:cs typeface="Open Sans" panose="020B0606030504020204" pitchFamily="34" charset="0"/>
+            </a:endParaRPr>
+          </a:p>
+          <a:p>
+            <a:r>
+              <a:rPr lang="en-CA" sz="1400" dirty="0">
+                <a:latin typeface="Open Sans" panose="020B0606030504020204" pitchFamily="34" charset="0"/>
+                <a:ea typeface="Open Sans" panose="020B0606030504020204" pitchFamily="34" charset="0"/>
+                <a:cs typeface="Open Sans" panose="020B0606030504020204" pitchFamily="34" charset="0"/>
+              </a:rPr>
+              <a:t>  {"</a:t>
+            </a:r>
+            <a:r>
+              <a:rPr lang="en-CA" sz="1400" dirty="0" err="1">
+                <a:latin typeface="Open Sans" panose="020B0606030504020204" pitchFamily="34" charset="0"/>
+                <a:ea typeface="Open Sans" panose="020B0606030504020204" pitchFamily="34" charset="0"/>
+                <a:cs typeface="Open Sans" panose="020B0606030504020204" pitchFamily="34" charset="0"/>
+              </a:rPr>
+              <a:t>name":"Maurice</a:t>
+            </a:r>
+            <a:r>
+              <a:rPr lang="en-CA" sz="1400" dirty="0">
+                <a:latin typeface="Open Sans" panose="020B0606030504020204" pitchFamily="34" charset="0"/>
+                <a:ea typeface="Open Sans" panose="020B0606030504020204" pitchFamily="34" charset="0"/>
+                <a:cs typeface="Open Sans" panose="020B0606030504020204" pitchFamily="34" charset="0"/>
+              </a:rPr>
+              <a:t>"," language":"fr","dob":"1921-05-15"},</a:t>
+            </a:r>
+          </a:p>
+          <a:p>
+            <a:endParaRPr lang="en-CA" sz="1400" dirty="0">
+              <a:latin typeface="Open Sans" panose="020B0606030504020204" pitchFamily="34" charset="0"/>
+              <a:ea typeface="Open Sans" panose="020B0606030504020204" pitchFamily="34" charset="0"/>
+              <a:cs typeface="Open Sans" panose="020B0606030504020204" pitchFamily="34" charset="0"/>
+            </a:endParaRPr>
+          </a:p>
+          <a:p>
+            <a:r>
+              <a:rPr lang="en-CA" sz="1400" dirty="0">
+                <a:latin typeface="Open Sans" panose="020B0606030504020204" pitchFamily="34" charset="0"/>
+                <a:ea typeface="Open Sans" panose="020B0606030504020204" pitchFamily="34" charset="0"/>
+                <a:cs typeface="Open Sans" panose="020B0606030504020204" pitchFamily="34" charset="0"/>
+              </a:rPr>
+              <a:t>  {"</a:t>
+            </a:r>
+            <a:r>
+              <a:rPr lang="en-CA" sz="1400" dirty="0" err="1">
+                <a:latin typeface="Open Sans" panose="020B0606030504020204" pitchFamily="34" charset="0"/>
+                <a:ea typeface="Open Sans" panose="020B0606030504020204" pitchFamily="34" charset="0"/>
+                <a:cs typeface="Open Sans" panose="020B0606030504020204" pitchFamily="34" charset="0"/>
+              </a:rPr>
+              <a:t>name":"Alice</a:t>
+            </a:r>
+            <a:r>
+              <a:rPr lang="en-CA" sz="1400" dirty="0">
+                <a:latin typeface="Open Sans" panose="020B0606030504020204" pitchFamily="34" charset="0"/>
+                <a:ea typeface="Open Sans" panose="020B0606030504020204" pitchFamily="34" charset="0"/>
+                <a:cs typeface="Open Sans" panose="020B0606030504020204" pitchFamily="34" charset="0"/>
+              </a:rPr>
+              <a:t>"," language":"en","dob":"1915-04-05"}</a:t>
+            </a:r>
+          </a:p>
+          <a:p>
+            <a:r>
+              <a:rPr lang="en-CA" sz="1400" dirty="0">
+                <a:latin typeface="Open Sans" panose="020B0606030504020204" pitchFamily="34" charset="0"/>
+                <a:ea typeface="Open Sans" panose="020B0606030504020204" pitchFamily="34" charset="0"/>
+                <a:cs typeface="Open Sans" panose="020B0606030504020204" pitchFamily="34" charset="0"/>
+              </a:rPr>
+              <a:t>];</a:t>
+            </a:r>
+          </a:p>
+          <a:p>
+            <a:endParaRPr lang="en-CA" sz="1400" dirty="0">
+              <a:latin typeface="Open Sans" panose="020B0606030504020204" pitchFamily="34" charset="0"/>
+              <a:ea typeface="Open Sans" panose="020B0606030504020204" pitchFamily="34" charset="0"/>
+              <a:cs typeface="Open Sans" panose="020B0606030504020204" pitchFamily="34" charset="0"/>
+            </a:endParaRPr>
+          </a:p>
+          <a:p>
+            <a:r>
+              <a:rPr lang="en-CA" sz="1400" dirty="0">
+                <a:latin typeface="Open Sans" panose="020B0606030504020204" pitchFamily="34" charset="0"/>
+                <a:ea typeface="Open Sans" panose="020B0606030504020204" pitchFamily="34" charset="0"/>
+                <a:cs typeface="Open Sans" panose="020B0606030504020204" pitchFamily="34" charset="0"/>
+              </a:rPr>
+              <a:t>for(var c=0; c&lt;</a:t>
+            </a:r>
+            <a:r>
+              <a:rPr lang="en-CA" sz="1400" dirty="0" err="1">
+                <a:latin typeface="Open Sans" panose="020B0606030504020204" pitchFamily="34" charset="0"/>
+                <a:ea typeface="Open Sans" panose="020B0606030504020204" pitchFamily="34" charset="0"/>
+                <a:cs typeface="Open Sans" panose="020B0606030504020204" pitchFamily="34" charset="0"/>
+              </a:rPr>
+              <a:t>humans.length</a:t>
+            </a:r>
+            <a:r>
+              <a:rPr lang="en-CA" sz="1400" dirty="0">
+                <a:latin typeface="Open Sans" panose="020B0606030504020204" pitchFamily="34" charset="0"/>
+                <a:ea typeface="Open Sans" panose="020B0606030504020204" pitchFamily="34" charset="0"/>
+                <a:cs typeface="Open Sans" panose="020B0606030504020204" pitchFamily="34" charset="0"/>
+              </a:rPr>
+              <a:t>; </a:t>
+            </a:r>
+            <a:r>
+              <a:rPr lang="en-CA" sz="1400" dirty="0" err="1">
+                <a:latin typeface="Open Sans" panose="020B0606030504020204" pitchFamily="34" charset="0"/>
+                <a:ea typeface="Open Sans" panose="020B0606030504020204" pitchFamily="34" charset="0"/>
+                <a:cs typeface="Open Sans" panose="020B0606030504020204" pitchFamily="34" charset="0"/>
+              </a:rPr>
+              <a:t>c++</a:t>
+            </a:r>
+            <a:r>
+              <a:rPr lang="en-CA" sz="1400" dirty="0">
+                <a:latin typeface="Open Sans" panose="020B0606030504020204" pitchFamily="34" charset="0"/>
+                <a:ea typeface="Open Sans" panose="020B0606030504020204" pitchFamily="34" charset="0"/>
+                <a:cs typeface="Open Sans" panose="020B0606030504020204" pitchFamily="34" charset="0"/>
+              </a:rPr>
+              <a:t>)</a:t>
+            </a:r>
+          </a:p>
+          <a:p>
+            <a:r>
+              <a:rPr lang="en-CA" sz="1400" dirty="0">
+                <a:latin typeface="Open Sans" panose="020B0606030504020204" pitchFamily="34" charset="0"/>
+                <a:ea typeface="Open Sans" panose="020B0606030504020204" pitchFamily="34" charset="0"/>
+                <a:cs typeface="Open Sans" panose="020B0606030504020204" pitchFamily="34" charset="0"/>
+              </a:rPr>
+              <a:t>  console.log(humans[c].name + " " + humans[c].language + " " + humans[c].dob);</a:t>
+            </a:r>
+          </a:p>
+          <a:p>
+            <a:endParaRPr lang="en-CA" sz="1400" dirty="0">
+              <a:latin typeface="Open Sans" panose="020B0606030504020204" pitchFamily="34" charset="0"/>
+              <a:ea typeface="Open Sans" panose="020B0606030504020204" pitchFamily="34" charset="0"/>
+              <a:cs typeface="Open Sans" panose="020B0606030504020204" pitchFamily="34" charset="0"/>
+            </a:endParaRPr>
+          </a:p>
+        </p:txBody>
+      </p:sp>
+    </p:spTree>
+    <p:extLst>
+      <p:ext uri="{BB962C8B-B14F-4D97-AF65-F5344CB8AC3E}">
+        <p14:creationId xmlns:p14="http://schemas.microsoft.com/office/powerpoint/2010/main" val="1108251136"/>
       </p:ext>
     </p:extLst>
   </p:cSld>

</xml_diff>

<commit_message>
coding crash course notes
</commit_message>
<xml_diff>
--- a/crash-course/20230624-shell-js-python-php/fundamentals-of-coding.pptx
+++ b/crash-course/20230624-shell-js-python-php/fundamentals-of-coding.pptx
@@ -211,7 +211,7 @@
           <a:p>
             <a:fld id="{23A89A84-B49D-4BBC-B2F1-D40A0CCB7390}" type="datetimeFigureOut">
               <a:rPr lang="en-CA" smtClean="0"/>
-              <a:t>2023-06-21</a:t>
+              <a:t>2023-06-24</a:t>
             </a:fld>
             <a:endParaRPr lang="en-CA"/>
           </a:p>
@@ -981,7 +981,7 @@
           <a:p>
             <a:fld id="{A857E3B2-F749-45FE-9390-A42869309754}" type="datetimeFigureOut">
               <a:rPr lang="en-CA" smtClean="0"/>
-              <a:t>2023-06-21</a:t>
+              <a:t>2023-06-24</a:t>
             </a:fld>
             <a:endParaRPr lang="en-CA"/>
           </a:p>
@@ -1270,7 +1270,7 @@
           <a:p>
             <a:fld id="{A857E3B2-F749-45FE-9390-A42869309754}" type="datetimeFigureOut">
               <a:rPr lang="en-CA" smtClean="0"/>
-              <a:t>2023-06-21</a:t>
+              <a:t>2023-06-24</a:t>
             </a:fld>
             <a:endParaRPr lang="en-CA"/>
           </a:p>
@@ -1470,7 +1470,7 @@
           <a:p>
             <a:fld id="{A857E3B2-F749-45FE-9390-A42869309754}" type="datetimeFigureOut">
               <a:rPr lang="en-CA" smtClean="0"/>
-              <a:t>2023-06-21</a:t>
+              <a:t>2023-06-24</a:t>
             </a:fld>
             <a:endParaRPr lang="en-CA"/>
           </a:p>
@@ -1680,7 +1680,7 @@
           <a:p>
             <a:fld id="{A857E3B2-F749-45FE-9390-A42869309754}" type="datetimeFigureOut">
               <a:rPr lang="en-CA" smtClean="0"/>
-              <a:t>2023-06-21</a:t>
+              <a:t>2023-06-24</a:t>
             </a:fld>
             <a:endParaRPr lang="en-CA"/>
           </a:p>
@@ -2080,7 +2080,7 @@
           <a:p>
             <a:fld id="{A857E3B2-F749-45FE-9390-A42869309754}" type="datetimeFigureOut">
               <a:rPr lang="en-CA" smtClean="0"/>
-              <a:t>2023-06-21</a:t>
+              <a:t>2023-06-24</a:t>
             </a:fld>
             <a:endParaRPr lang="en-CA"/>
           </a:p>
@@ -2280,7 +2280,7 @@
           <a:p>
             <a:fld id="{A857E3B2-F749-45FE-9390-A42869309754}" type="datetimeFigureOut">
               <a:rPr lang="en-CA" smtClean="0"/>
-              <a:t>2023-06-21</a:t>
+              <a:t>2023-06-24</a:t>
             </a:fld>
             <a:endParaRPr lang="en-CA"/>
           </a:p>
@@ -2556,7 +2556,7 @@
           <a:p>
             <a:fld id="{A857E3B2-F749-45FE-9390-A42869309754}" type="datetimeFigureOut">
               <a:rPr lang="en-CA" smtClean="0"/>
-              <a:t>2023-06-21</a:t>
+              <a:t>2023-06-24</a:t>
             </a:fld>
             <a:endParaRPr lang="en-CA"/>
           </a:p>
@@ -2824,7 +2824,7 @@
           <a:p>
             <a:fld id="{A857E3B2-F749-45FE-9390-A42869309754}" type="datetimeFigureOut">
               <a:rPr lang="en-CA" smtClean="0"/>
-              <a:t>2023-06-21</a:t>
+              <a:t>2023-06-24</a:t>
             </a:fld>
             <a:endParaRPr lang="en-CA"/>
           </a:p>
@@ -3239,7 +3239,7 @@
           <a:p>
             <a:fld id="{A857E3B2-F749-45FE-9390-A42869309754}" type="datetimeFigureOut">
               <a:rPr lang="en-CA" smtClean="0"/>
-              <a:t>2023-06-21</a:t>
+              <a:t>2023-06-24</a:t>
             </a:fld>
             <a:endParaRPr lang="en-CA"/>
           </a:p>
@@ -3381,7 +3381,7 @@
           <a:p>
             <a:fld id="{A857E3B2-F749-45FE-9390-A42869309754}" type="datetimeFigureOut">
               <a:rPr lang="en-CA" smtClean="0"/>
-              <a:t>2023-06-21</a:t>
+              <a:t>2023-06-24</a:t>
             </a:fld>
             <a:endParaRPr lang="en-CA"/>
           </a:p>
@@ -3494,7 +3494,7 @@
           <a:p>
             <a:fld id="{A857E3B2-F749-45FE-9390-A42869309754}" type="datetimeFigureOut">
               <a:rPr lang="en-CA" smtClean="0"/>
-              <a:t>2023-06-21</a:t>
+              <a:t>2023-06-24</a:t>
             </a:fld>
             <a:endParaRPr lang="en-CA"/>
           </a:p>
@@ -3737,7 +3737,7 @@
           <a:p>
             <a:fld id="{A857E3B2-F749-45FE-9390-A42869309754}" type="datetimeFigureOut">
               <a:rPr lang="en-CA" smtClean="0"/>
-              <a:t>2023-06-21</a:t>
+              <a:t>2023-06-24</a:t>
             </a:fld>
             <a:endParaRPr lang="en-CA"/>
           </a:p>
@@ -9013,7 +9013,7 @@
                 <a:ea typeface="Open Sans" panose="020B0606030504020204" pitchFamily="34" charset="0"/>
                 <a:cs typeface="Open Sans" panose="020B0606030504020204" pitchFamily="34" charset="0"/>
               </a:rPr>
-              <a:t>"Hello World"; </a:t>
+              <a:t>"H"; </a:t>
             </a:r>
             <a:r>
               <a:rPr lang="en-CA" sz="2200" dirty="0">
@@ -9026,8 +9026,31 @@
                 <a:ea typeface="Open Sans" panose="020B0606030504020204" pitchFamily="34" charset="0"/>
                 <a:cs typeface="Open Sans" panose="020B0606030504020204" pitchFamily="34" charset="0"/>
               </a:rPr>
-              <a:t>// string</a:t>
-            </a:r>
+              <a:t>// character (strings are just sequences </a:t>
+            </a:r>
+            <a:r>
+              <a:rPr lang="en-CA" sz="2200">
+                <a:solidFill>
+                  <a:schemeClr val="bg2">
+                    <a:lumMod val="50000"/>
+                  </a:schemeClr>
+                </a:solidFill>
+                <a:latin typeface="Open Sans" panose="020B0606030504020204" pitchFamily="34" charset="0"/>
+                <a:ea typeface="Open Sans" panose="020B0606030504020204" pitchFamily="34" charset="0"/>
+                <a:cs typeface="Open Sans" panose="020B0606030504020204" pitchFamily="34" charset="0"/>
+              </a:rPr>
+              <a:t>of characters)</a:t>
+            </a:r>
+            <a:endParaRPr lang="en-CA" sz="2200" dirty="0">
+              <a:solidFill>
+                <a:schemeClr val="bg2">
+                  <a:lumMod val="50000"/>
+                </a:schemeClr>
+              </a:solidFill>
+              <a:latin typeface="Open Sans" panose="020B0606030504020204" pitchFamily="34" charset="0"/>
+              <a:ea typeface="Open Sans" panose="020B0606030504020204" pitchFamily="34" charset="0"/>
+              <a:cs typeface="Open Sans" panose="020B0606030504020204" pitchFamily="34" charset="0"/>
+            </a:endParaRPr>
           </a:p>
           <a:p>
             <a:r>

</xml_diff>

<commit_message>
schedule update and post video link
</commit_message>
<xml_diff>
--- a/crash-course/20230624-shell-js-python-php/fundamentals-of-coding.pptx
+++ b/crash-course/20230624-shell-js-python-php/fundamentals-of-coding.pptx
@@ -6390,20 +6390,12 @@
           </a:p>
           <a:p>
             <a:r>
-              <a:rPr lang="en-CA" sz="1500">
-                <a:latin typeface="Open Sans" panose="020B0606030504020204" pitchFamily="34" charset="0"/>
-                <a:ea typeface="Open Sans" panose="020B0606030504020204" pitchFamily="34" charset="0"/>
-                <a:cs typeface="Open Sans" panose="020B0606030504020204" pitchFamily="34" charset="0"/>
-              </a:rPr>
-              <a:t>  let </a:t>
-            </a:r>
-            <a:r>
               <a:rPr lang="en-CA" sz="1500" dirty="0">
                 <a:latin typeface="Open Sans" panose="020B0606030504020204" pitchFamily="34" charset="0"/>
                 <a:ea typeface="Open Sans" panose="020B0606030504020204" pitchFamily="34" charset="0"/>
                 <a:cs typeface="Open Sans" panose="020B0606030504020204" pitchFamily="34" charset="0"/>
               </a:rPr>
-              <a:t>total = principal*</a:t>
+              <a:t>  let total = principal*</a:t>
             </a:r>
             <a:r>
               <a:rPr lang="en-CA" sz="1500" dirty="0" err="1">

</xml_diff>